<commit_message>
updated SEP 036, 036, 043
</commit_message>
<xml_diff>
--- a/images/SEP037.pptx
+++ b/images/SEP037.pptx
@@ -216,7 +216,7 @@
           <a:p>
             <a:fld id="{AC861A86-5494-5244-8FB4-8B9B0FE298A2}" type="datetimeFigureOut">
               <a:rPr lang="en-US" smtClean="0"/>
-              <a:t>11/24/19</a:t>
+              <a:t>1/26/20</a:t>
             </a:fld>
             <a:endParaRPr lang="en-US"/>
           </a:p>
@@ -382,7 +382,7 @@
           <a:p>
             <a:fld id="{CF8A4C15-9D08-44BE-9908-991722DC07A4}" type="datetimeFigureOut">
               <a:rPr lang="en-US" smtClean="0"/>
-              <a:t>11/24/19</a:t>
+              <a:t>1/26/20</a:t>
             </a:fld>
             <a:endParaRPr lang="en-US"/>
           </a:p>
@@ -1166,7 +1166,7 @@
           <a:p>
             <a:fld id="{55158164-104B-EE4F-A1E4-DFD76C5D5D53}" type="datetime1">
               <a:rPr lang="en-US" smtClean="0"/>
-              <a:t>11/24/19</a:t>
+              <a:t>1/26/20</a:t>
             </a:fld>
             <a:endParaRPr lang="en-US"/>
           </a:p>
@@ -1267,7 +1267,7 @@
           </a:ln>
           <a:extLst>
             <a:ext uri="{91240B29-F687-4f45-9708-019B960494DF}">
-              <a14:hiddenLine xmlns:a14="http://schemas.microsoft.com/office/drawing/2010/main" xmlns="" w="9525">
+              <a14:hiddenLine xmlns="" xmlns:a14="http://schemas.microsoft.com/office/drawing/2010/main" w="9525">
                 <a:solidFill>
                   <a:srgbClr val="000000"/>
                 </a:solidFill>
@@ -1322,7 +1322,7 @@
           </a:ln>
           <a:extLst>
             <a:ext uri="{91240B29-F687-4f45-9708-019B960494DF}">
-              <a14:hiddenLine xmlns:a14="http://schemas.microsoft.com/office/drawing/2010/main" xmlns="" w="9525">
+              <a14:hiddenLine xmlns="" xmlns:a14="http://schemas.microsoft.com/office/drawing/2010/main" w="9525">
                 <a:solidFill>
                   <a:srgbClr val="000000"/>
                 </a:solidFill>
@@ -1577,7 +1577,7 @@
           <a:p>
             <a:fld id="{D3C8E1F3-BE47-4044-A97F-EFC75FD29BC1}" type="datetime1">
               <a:rPr lang="en-US" smtClean="0"/>
-              <a:t>11/24/19</a:t>
+              <a:t>1/26/20</a:t>
             </a:fld>
             <a:endParaRPr lang="en-US"/>
           </a:p>
@@ -1825,7 +1825,7 @@
           <a:p>
             <a:fld id="{3F5031B9-01B9-7047-B552-C013DA4C2A39}" type="datetime1">
               <a:rPr lang="en-US" smtClean="0"/>
-              <a:t>11/24/19</a:t>
+              <a:t>1/26/20</a:t>
             </a:fld>
             <a:endParaRPr lang="en-US"/>
           </a:p>
@@ -2365,7 +2365,7 @@
           <a:p>
             <a:fld id="{2AB77CA6-198C-0F4D-AECB-07C218E4D55F}" type="datetime1">
               <a:rPr lang="en-US" smtClean="0"/>
-              <a:t>11/24/19</a:t>
+              <a:t>1/26/20</a:t>
             </a:fld>
             <a:endParaRPr lang="en-US"/>
           </a:p>
@@ -2613,7 +2613,7 @@
           <a:p>
             <a:fld id="{BA2BE7C8-AC47-9642-9C4B-4A8081FE5F08}" type="datetime1">
               <a:rPr lang="en-US" smtClean="0"/>
-              <a:t>11/24/19</a:t>
+              <a:t>1/26/20</a:t>
             </a:fld>
             <a:endParaRPr lang="en-US"/>
           </a:p>
@@ -3145,7 +3145,7 @@
           <a:p>
             <a:fld id="{8AC07479-49B2-D64D-B87A-1D036117BD32}" type="datetime1">
               <a:rPr lang="en-US" smtClean="0"/>
-              <a:t>11/24/19</a:t>
+              <a:t>1/26/20</a:t>
             </a:fld>
             <a:endParaRPr lang="en-US"/>
           </a:p>
@@ -3442,7 +3442,7 @@
           <a:p>
             <a:fld id="{47BE2083-98A0-494E-96E5-57A024809BBB}" type="datetime1">
               <a:rPr lang="en-US" smtClean="0"/>
-              <a:t>11/24/19</a:t>
+              <a:t>1/26/20</a:t>
             </a:fld>
             <a:endParaRPr lang="en-US"/>
           </a:p>
@@ -3616,7 +3616,7 @@
           <a:p>
             <a:fld id="{BAE362AC-1F4C-A142-BBAB-35DEE19E089C}" type="datetime1">
               <a:rPr lang="en-US" smtClean="0"/>
-              <a:t>11/24/19</a:t>
+              <a:t>1/26/20</a:t>
             </a:fld>
             <a:endParaRPr lang="en-US"/>
           </a:p>
@@ -3796,7 +3796,7 @@
           <a:p>
             <a:fld id="{E3203DEE-4F0C-BD4D-94D3-7B4048608461}" type="datetime1">
               <a:rPr lang="en-US" smtClean="0"/>
-              <a:t>11/24/19</a:t>
+              <a:t>1/26/20</a:t>
             </a:fld>
             <a:endParaRPr lang="en-US"/>
           </a:p>
@@ -3981,7 +3981,7 @@
           <a:p>
             <a:fld id="{7034CD2D-1430-3C44-BF7A-01544DD8062E}" type="datetime1">
               <a:rPr lang="en-US" smtClean="0"/>
-              <a:t>11/24/19</a:t>
+              <a:t>1/26/20</a:t>
             </a:fld>
             <a:endParaRPr lang="en-US"/>
           </a:p>
@@ -4237,7 +4237,7 @@
           <a:p>
             <a:fld id="{8A05D642-7D5B-2D46-9E92-88D3869CC61C}" type="datetime1">
               <a:rPr lang="en-US" smtClean="0"/>
-              <a:t>11/24/19</a:t>
+              <a:t>1/26/20</a:t>
             </a:fld>
             <a:endParaRPr lang="en-US"/>
           </a:p>
@@ -4539,7 +4539,7 @@
           <a:p>
             <a:fld id="{F39C7A97-83DE-D242-8942-BEEC49C430EC}" type="datetime1">
               <a:rPr lang="en-US" smtClean="0"/>
-              <a:t>11/24/19</a:t>
+              <a:t>1/26/20</a:t>
             </a:fld>
             <a:endParaRPr lang="en-US"/>
           </a:p>
@@ -4981,7 +4981,7 @@
           <a:p>
             <a:fld id="{68B8F0D7-076E-8744-BF87-211ABDF40EEE}" type="datetime1">
               <a:rPr lang="en-US" smtClean="0"/>
-              <a:t>11/24/19</a:t>
+              <a:t>1/26/20</a:t>
             </a:fld>
             <a:endParaRPr lang="en-US"/>
           </a:p>
@@ -5099,7 +5099,7 @@
           <a:p>
             <a:fld id="{C1443501-53DF-9A44-B5A1-F4B6F4F70E65}" type="datetime1">
               <a:rPr lang="en-US" smtClean="0"/>
-              <a:t>11/24/19</a:t>
+              <a:t>1/26/20</a:t>
             </a:fld>
             <a:endParaRPr lang="en-US"/>
           </a:p>
@@ -5194,7 +5194,7 @@
           <a:p>
             <a:fld id="{99211CF8-3C51-4448-A604-0A860CF05CF6}" type="datetime1">
               <a:rPr lang="en-US" smtClean="0"/>
-              <a:t>11/24/19</a:t>
+              <a:t>1/26/20</a:t>
             </a:fld>
             <a:endParaRPr lang="en-US"/>
           </a:p>
@@ -5477,7 +5477,7 @@
           <a:p>
             <a:fld id="{E79CC5FC-1A63-8441-9C17-2DFBAF0F3052}" type="datetime1">
               <a:rPr lang="en-US" smtClean="0"/>
-              <a:t>11/24/19</a:t>
+              <a:t>1/26/20</a:t>
             </a:fld>
             <a:endParaRPr lang="en-US"/>
           </a:p>
@@ -5768,7 +5768,7 @@
           <a:p>
             <a:fld id="{A48C2071-2111-F84C-A005-37A8A4EBBECE}" type="datetime1">
               <a:rPr lang="en-US" smtClean="0"/>
-              <a:t>11/24/19</a:t>
+              <a:t>1/26/20</a:t>
             </a:fld>
             <a:endParaRPr lang="en-US"/>
           </a:p>
@@ -6295,7 +6295,7 @@
           <a:p>
             <a:fld id="{41892FCB-93AF-574B-B021-5BAFA3955FB7}" type="datetime1">
               <a:rPr lang="en-US" smtClean="0"/>
-              <a:t>11/24/19</a:t>
+              <a:t>1/26/20</a:t>
             </a:fld>
             <a:endParaRPr lang="en-US"/>
           </a:p>
@@ -9295,7 +9295,7 @@
                     <a:schemeClr val="tx1"/>
                   </a:solidFill>
                 </a:rPr>
-                <a:t>CD: </a:t>
+                <a:t>C: </a:t>
               </a:r>
               <a:r>
                 <a:rPr lang="en-US" dirty="0">
@@ -9585,7 +9585,7 @@
                     <a:schemeClr val="tx1"/>
                   </a:solidFill>
                 </a:rPr>
-                <a:t>CD: </a:t>
+                <a:t>C: </a:t>
               </a:r>
               <a:r>
                 <a:rPr lang="en-US" dirty="0">
@@ -9673,16 +9673,14 @@
             <a:avLst/>
           </a:prstGeom>
           <a:solidFill>
-            <a:schemeClr val="accent4">
+            <a:schemeClr val="accent1">
               <a:lumMod val="20000"/>
               <a:lumOff val="80000"/>
             </a:schemeClr>
           </a:solidFill>
           <a:ln>
             <a:solidFill>
-              <a:schemeClr val="accent4">
-                <a:lumMod val="75000"/>
-              </a:schemeClr>
+              <a:schemeClr val="accent1"/>
             </a:solidFill>
           </a:ln>
         </p:spPr>
@@ -9707,20 +9705,12 @@
           <a:lstStyle/>
           <a:p>
             <a:r>
-              <a:rPr lang="en-US" b="1" dirty="0" err="1">
+              <a:rPr lang="en-US" b="1" dirty="0">
                 <a:solidFill>
                   <a:schemeClr val="tx1"/>
                 </a:solidFill>
               </a:rPr>
-              <a:t>ModuleDefinition</a:t>
-            </a:r>
-            <a:r>
-              <a:rPr lang="en-US" b="1" dirty="0">
-                <a:solidFill>
-                  <a:schemeClr val="tx1"/>
-                </a:solidFill>
-              </a:rPr>
-              <a:t>: </a:t>
+              <a:t>Component: </a:t>
             </a:r>
             <a:r>
               <a:rPr lang="en-US" dirty="0">
@@ -10060,16 +10050,14 @@
             <a:avLst/>
           </a:prstGeom>
           <a:solidFill>
-            <a:schemeClr val="accent4">
+            <a:schemeClr val="accent1">
               <a:lumMod val="40000"/>
               <a:lumOff val="60000"/>
             </a:schemeClr>
           </a:solidFill>
           <a:ln>
             <a:solidFill>
-              <a:schemeClr val="accent4">
-                <a:lumMod val="75000"/>
-              </a:schemeClr>
+              <a:schemeClr val="accent1"/>
             </a:solidFill>
           </a:ln>
         </p:spPr>
@@ -10100,7 +10088,18 @@
                   <a:schemeClr val="tx1"/>
                 </a:solidFill>
               </a:rPr>
-              <a:t>Functional Component</a:t>
+              <a:t>Component</a:t>
+            </a:r>
+          </a:p>
+          <a:p>
+            <a:pPr algn="ctr"/>
+            <a:r>
+              <a:rPr lang="en-US" b="1" dirty="0">
+                <a:solidFill>
+                  <a:schemeClr val="tx1"/>
+                </a:solidFill>
+              </a:rPr>
+              <a:t>Instance</a:t>
             </a:r>
             <a:endParaRPr lang="en-US" dirty="0">
               <a:solidFill>
@@ -10132,7 +10131,7 @@
           </a:prstGeom>
           <a:ln w="38100">
             <a:solidFill>
-              <a:schemeClr val="accent4">
+              <a:schemeClr val="accent1">
                 <a:lumMod val="75000"/>
               </a:schemeClr>
             </a:solidFill>
@@ -10176,7 +10175,7 @@
           </a:prstGeom>
           <a:ln w="38100">
             <a:solidFill>
-              <a:schemeClr val="accent4">
+              <a:schemeClr val="accent1">
                 <a:lumMod val="75000"/>
               </a:schemeClr>
             </a:solidFill>
@@ -10219,7 +10218,7 @@
           </a:prstGeom>
           <a:ln w="38100">
             <a:solidFill>
-              <a:schemeClr val="accent4">
+              <a:schemeClr val="accent1">
                 <a:lumMod val="75000"/>
               </a:schemeClr>
             </a:solidFill>
@@ -10262,7 +10261,7 @@
           </a:prstGeom>
           <a:ln w="38100">
             <a:solidFill>
-              <a:schemeClr val="accent4">
+              <a:schemeClr val="accent1">
                 <a:lumMod val="75000"/>
               </a:schemeClr>
             </a:solidFill>
@@ -10299,16 +10298,14 @@
             <a:avLst/>
           </a:prstGeom>
           <a:solidFill>
-            <a:schemeClr val="accent4">
+            <a:schemeClr val="accent1">
               <a:lumMod val="40000"/>
               <a:lumOff val="60000"/>
             </a:schemeClr>
           </a:solidFill>
           <a:ln>
             <a:solidFill>
-              <a:schemeClr val="accent4">
-                <a:lumMod val="75000"/>
-              </a:schemeClr>
+              <a:schemeClr val="accent1"/>
             </a:solidFill>
           </a:ln>
         </p:spPr>
@@ -10334,12 +10331,23 @@
           <a:p>
             <a:pPr algn="ctr"/>
             <a:r>
-              <a:rPr lang="en-US" b="1">
+              <a:rPr lang="en-US" b="1" dirty="0">
                 <a:solidFill>
                   <a:schemeClr val="tx1"/>
                 </a:solidFill>
               </a:rPr>
-              <a:t>Functional Component</a:t>
+              <a:t>Component</a:t>
+            </a:r>
+          </a:p>
+          <a:p>
+            <a:pPr algn="ctr"/>
+            <a:r>
+              <a:rPr lang="en-US" b="1" dirty="0">
+                <a:solidFill>
+                  <a:schemeClr val="tx1"/>
+                </a:solidFill>
+              </a:rPr>
+              <a:t>Instance</a:t>
             </a:r>
             <a:endParaRPr lang="en-US" dirty="0">
               <a:solidFill>
@@ -10832,7 +10840,7 @@
                     <a:schemeClr val="tx1"/>
                   </a:solidFill>
                 </a:rPr>
-                <a:t>CD: </a:t>
+                <a:t>C: </a:t>
               </a:r>
               <a:r>
                 <a:rPr lang="en-US" dirty="0">
@@ -10988,8 +10996,8 @@
         </p:nvSpPr>
         <p:spPr>
           <a:xfrm>
-            <a:off x="3080612" y="5605258"/>
-            <a:ext cx="1435100" cy="406400"/>
+            <a:off x="3080612" y="5558958"/>
+            <a:ext cx="1435100" cy="507510"/>
           </a:xfrm>
           <a:prstGeom prst="rect">
             <a:avLst/>
@@ -11029,6 +11037,17 @@
                 </a:solidFill>
               </a:rPr>
               <a:t>Component</a:t>
+            </a:r>
+          </a:p>
+          <a:p>
+            <a:pPr algn="ctr"/>
+            <a:r>
+              <a:rPr lang="en-US" b="1" dirty="0">
+                <a:solidFill>
+                  <a:schemeClr val="tx1"/>
+                </a:solidFill>
+              </a:rPr>
+              <a:t>Instance</a:t>
             </a:r>
             <a:endParaRPr lang="en-US" dirty="0">
               <a:solidFill>
@@ -11057,12 +11076,10 @@
         <p:spPr>
           <a:xfrm>
             <a:off x="2472479" y="5807968"/>
-            <a:ext cx="608133" cy="490"/>
-          </a:xfrm>
-          <a:prstGeom prst="bentConnector3">
-            <a:avLst>
-              <a:gd name="adj1" fmla="val 50000"/>
-            </a:avLst>
+            <a:ext cx="608133" cy="4745"/>
+          </a:xfrm>
+          <a:prstGeom prst="straightConnector1">
+            <a:avLst/>
           </a:prstGeom>
           <a:ln w="38100">
             <a:solidFill>
@@ -11107,12 +11124,10 @@
         <p:spPr>
           <a:xfrm flipV="1">
             <a:off x="4515712" y="5807391"/>
-            <a:ext cx="416730" cy="1067"/>
-          </a:xfrm>
-          <a:prstGeom prst="bentConnector3">
-            <a:avLst>
-              <a:gd name="adj1" fmla="val 50000"/>
-            </a:avLst>
+            <a:ext cx="416730" cy="5322"/>
+          </a:xfrm>
+          <a:prstGeom prst="straightConnector1">
+            <a:avLst/>
           </a:prstGeom>
           <a:ln w="38100">
             <a:solidFill>
@@ -11287,8 +11302,8 @@
         </p:nvCxnSpPr>
         <p:spPr>
           <a:xfrm rot="5400000">
-            <a:off x="3106834" y="4912341"/>
-            <a:ext cx="1384246" cy="1589"/>
+            <a:off x="3129984" y="4889191"/>
+            <a:ext cx="1337946" cy="1589"/>
           </a:xfrm>
           <a:prstGeom prst="bentConnector3">
             <a:avLst>
@@ -14863,7 +14878,7 @@
                     <a:schemeClr val="tx1"/>
                   </a:solidFill>
                 </a:rPr>
-                <a:t>CD: </a:t>
+                <a:t>C: </a:t>
               </a:r>
               <a:r>
                 <a:rPr lang="en-US" dirty="0">
@@ -15153,7 +15168,7 @@
                     <a:schemeClr val="tx1"/>
                   </a:solidFill>
                 </a:rPr>
-                <a:t>CD: </a:t>
+                <a:t>C: </a:t>
               </a:r>
               <a:r>
                 <a:rPr lang="en-US" dirty="0">
@@ -15241,16 +15256,14 @@
             <a:avLst/>
           </a:prstGeom>
           <a:solidFill>
-            <a:schemeClr val="accent4">
+            <a:schemeClr val="accent1">
               <a:lumMod val="20000"/>
               <a:lumOff val="80000"/>
             </a:schemeClr>
           </a:solidFill>
           <a:ln>
             <a:solidFill>
-              <a:schemeClr val="accent4">
-                <a:lumMod val="75000"/>
-              </a:schemeClr>
+              <a:schemeClr val="accent1"/>
             </a:solidFill>
           </a:ln>
         </p:spPr>
@@ -15275,20 +15288,12 @@
           <a:lstStyle/>
           <a:p>
             <a:r>
-              <a:rPr lang="en-US" b="1" dirty="0" err="1">
+              <a:rPr lang="en-US" b="1" dirty="0">
                 <a:solidFill>
                   <a:schemeClr val="tx1"/>
                 </a:solidFill>
               </a:rPr>
-              <a:t>ModuleDefinition</a:t>
-            </a:r>
-            <a:r>
-              <a:rPr lang="en-US" b="1" dirty="0">
-                <a:solidFill>
-                  <a:schemeClr val="tx1"/>
-                </a:solidFill>
-              </a:rPr>
-              <a:t>: </a:t>
+              <a:t>Component: </a:t>
             </a:r>
             <a:r>
               <a:rPr lang="en-US" dirty="0">
@@ -15628,16 +15633,14 @@
             <a:avLst/>
           </a:prstGeom>
           <a:solidFill>
-            <a:schemeClr val="accent4">
+            <a:schemeClr val="accent1">
               <a:lumMod val="40000"/>
               <a:lumOff val="60000"/>
             </a:schemeClr>
           </a:solidFill>
           <a:ln>
             <a:solidFill>
-              <a:schemeClr val="accent4">
-                <a:lumMod val="75000"/>
-              </a:schemeClr>
+              <a:schemeClr val="accent1"/>
             </a:solidFill>
           </a:ln>
         </p:spPr>
@@ -15663,12 +15666,12 @@
           <a:p>
             <a:pPr algn="ctr"/>
             <a:r>
-              <a:rPr lang="en-US" b="1" dirty="0">
+              <a:rPr lang="en-US" b="1" dirty="0" err="1">
                 <a:solidFill>
                   <a:schemeClr val="tx1"/>
                 </a:solidFill>
               </a:rPr>
-              <a:t>Functional Component</a:t>
+              <a:t>ComponentInstance</a:t>
             </a:r>
             <a:endParaRPr lang="en-US" dirty="0">
               <a:solidFill>
@@ -15700,7 +15703,7 @@
           </a:prstGeom>
           <a:ln w="38100">
             <a:solidFill>
-              <a:schemeClr val="accent4">
+              <a:schemeClr val="accent1">
                 <a:lumMod val="75000"/>
               </a:schemeClr>
             </a:solidFill>
@@ -15744,7 +15747,7 @@
           </a:prstGeom>
           <a:ln w="38100">
             <a:solidFill>
-              <a:schemeClr val="accent4">
+              <a:schemeClr val="accent1">
                 <a:lumMod val="75000"/>
               </a:schemeClr>
             </a:solidFill>
@@ -15787,7 +15790,7 @@
           </a:prstGeom>
           <a:ln w="38100">
             <a:solidFill>
-              <a:schemeClr val="accent4">
+              <a:schemeClr val="accent1">
                 <a:lumMod val="75000"/>
               </a:schemeClr>
             </a:solidFill>
@@ -15830,7 +15833,7 @@
           </a:prstGeom>
           <a:ln w="38100">
             <a:solidFill>
-              <a:schemeClr val="accent4">
+              <a:schemeClr val="accent1">
                 <a:lumMod val="75000"/>
               </a:schemeClr>
             </a:solidFill>
@@ -15867,16 +15870,14 @@
             <a:avLst/>
           </a:prstGeom>
           <a:solidFill>
-            <a:schemeClr val="accent4">
+            <a:schemeClr val="accent1">
               <a:lumMod val="40000"/>
               <a:lumOff val="60000"/>
             </a:schemeClr>
           </a:solidFill>
           <a:ln>
             <a:solidFill>
-              <a:schemeClr val="accent4">
-                <a:lumMod val="75000"/>
-              </a:schemeClr>
+              <a:schemeClr val="accent1"/>
             </a:solidFill>
           </a:ln>
         </p:spPr>
@@ -15902,12 +15903,23 @@
           <a:p>
             <a:pPr algn="ctr"/>
             <a:r>
-              <a:rPr lang="en-US" b="1">
+              <a:rPr lang="en-US" b="1" dirty="0">
                 <a:solidFill>
                   <a:schemeClr val="tx1"/>
                 </a:solidFill>
               </a:rPr>
-              <a:t>Functional Component</a:t>
+              <a:t>Component</a:t>
+            </a:r>
+          </a:p>
+          <a:p>
+            <a:pPr algn="ctr"/>
+            <a:r>
+              <a:rPr lang="en-US" b="1" dirty="0">
+                <a:solidFill>
+                  <a:schemeClr val="tx1"/>
+                </a:solidFill>
+              </a:rPr>
+              <a:t>Instance</a:t>
             </a:r>
             <a:endParaRPr lang="en-US" dirty="0">
               <a:solidFill>
@@ -16400,7 +16412,7 @@
                     <a:schemeClr val="tx1"/>
                   </a:solidFill>
                 </a:rPr>
-                <a:t>CD: </a:t>
+                <a:t>C: </a:t>
               </a:r>
               <a:r>
                 <a:rPr lang="en-US" dirty="0">
@@ -16556,8 +16568,8 @@
         </p:nvSpPr>
         <p:spPr>
           <a:xfrm>
-            <a:off x="880663" y="6049380"/>
-            <a:ext cx="1435100" cy="406400"/>
+            <a:off x="880663" y="5991504"/>
+            <a:ext cx="1435100" cy="534279"/>
           </a:xfrm>
           <a:prstGeom prst="rect">
             <a:avLst/>
@@ -16597,6 +16609,17 @@
                 </a:solidFill>
               </a:rPr>
               <a:t>Component</a:t>
+            </a:r>
+          </a:p>
+          <a:p>
+            <a:pPr algn="ctr"/>
+            <a:r>
+              <a:rPr lang="en-US" b="1" dirty="0">
+                <a:solidFill>
+                  <a:schemeClr val="tx1"/>
+                </a:solidFill>
+              </a:rPr>
+              <a:t>Instance</a:t>
             </a:r>
             <a:endParaRPr lang="en-US" dirty="0">
               <a:solidFill>
@@ -16624,12 +16647,12 @@
         </p:nvCxnSpPr>
         <p:spPr>
           <a:xfrm rot="5400000">
-            <a:off x="482076" y="5369849"/>
-            <a:ext cx="1281318" cy="484144"/>
+            <a:off x="479044" y="5372881"/>
+            <a:ext cx="1287382" cy="484144"/>
           </a:xfrm>
           <a:prstGeom prst="bentConnector4">
             <a:avLst>
-              <a:gd name="adj1" fmla="val 42071"/>
+              <a:gd name="adj1" fmla="val 39625"/>
               <a:gd name="adj2" fmla="val 147217"/>
             </a:avLst>
           </a:prstGeom>
@@ -16674,9 +16697,9 @@
           <p:nvPr/>
         </p:nvCxnSpPr>
         <p:spPr>
-          <a:xfrm>
-            <a:off x="2315763" y="6252580"/>
-            <a:ext cx="262469" cy="879"/>
+          <a:xfrm flipV="1">
+            <a:off x="2315763" y="6253459"/>
+            <a:ext cx="262469" cy="5185"/>
           </a:xfrm>
           <a:prstGeom prst="bentConnector3">
             <a:avLst>
@@ -16780,7 +16803,7 @@
                     <a:schemeClr val="tx1"/>
                   </a:solidFill>
                 </a:rPr>
-                <a:t>CD: </a:t>
+                <a:t>C: </a:t>
               </a:r>
               <a:endParaRPr lang="en-US" dirty="0">
                 <a:solidFill>
@@ -16992,8 +17015,8 @@
         </p:nvSpPr>
         <p:spPr>
           <a:xfrm>
-            <a:off x="5294116" y="5254670"/>
-            <a:ext cx="1435100" cy="406400"/>
+            <a:off x="5294116" y="5254669"/>
+            <a:ext cx="1435100" cy="490789"/>
           </a:xfrm>
           <a:prstGeom prst="rect">
             <a:avLst/>
@@ -17033,6 +17056,17 @@
                 </a:solidFill>
               </a:rPr>
               <a:t>Component</a:t>
+            </a:r>
+          </a:p>
+          <a:p>
+            <a:pPr algn="ctr"/>
+            <a:r>
+              <a:rPr lang="en-US" b="1" dirty="0">
+                <a:solidFill>
+                  <a:schemeClr val="tx1"/>
+                </a:solidFill>
+              </a:rPr>
+              <a:t>Instance</a:t>
             </a:r>
             <a:endParaRPr lang="en-US" dirty="0">
               <a:solidFill>
@@ -17060,8 +17094,8 @@
         </p:nvCxnSpPr>
         <p:spPr>
           <a:xfrm rot="5400000" flipH="1" flipV="1">
-            <a:off x="5844168" y="5084970"/>
-            <a:ext cx="337198" cy="2203"/>
+            <a:off x="5844169" y="5084970"/>
+            <a:ext cx="337197" cy="2203"/>
           </a:xfrm>
           <a:prstGeom prst="bentConnector3">
             <a:avLst>
@@ -17110,8 +17144,8 @@
         </p:nvCxnSpPr>
         <p:spPr>
           <a:xfrm flipV="1">
-            <a:off x="4645923" y="5661070"/>
-            <a:ext cx="1365743" cy="592389"/>
+            <a:off x="4645923" y="5745458"/>
+            <a:ext cx="1365743" cy="508001"/>
           </a:xfrm>
           <a:prstGeom prst="bentConnector2">
             <a:avLst/>
@@ -17433,7 +17467,7 @@
         </p:nvSpPr>
         <p:spPr>
           <a:xfrm>
-            <a:off x="3645193" y="5430102"/>
+            <a:off x="3564168" y="5302777"/>
             <a:ext cx="1369286" cy="307777"/>
           </a:xfrm>
           <a:prstGeom prst="rect">
@@ -17567,8 +17601,8 @@
         </p:nvCxnSpPr>
         <p:spPr>
           <a:xfrm rot="5400000">
-            <a:off x="1913688" y="4211732"/>
-            <a:ext cx="1522173" cy="2153122"/>
+            <a:off x="1942626" y="4182794"/>
+            <a:ext cx="1464297" cy="2153122"/>
           </a:xfrm>
           <a:prstGeom prst="bentConnector3">
             <a:avLst>
@@ -17618,7 +17652,7 @@
         <p:spPr>
           <a:xfrm>
             <a:off x="4427991" y="4270230"/>
-            <a:ext cx="866125" cy="1187640"/>
+            <a:ext cx="866125" cy="1229834"/>
           </a:xfrm>
           <a:prstGeom prst="bentConnector3">
             <a:avLst>
@@ -20426,7 +20460,7 @@
                   <a:schemeClr val="tx1"/>
                 </a:solidFill>
               </a:rPr>
-              <a:t>CD:</a:t>
+              <a:t>C:</a:t>
             </a:r>
             <a:endParaRPr lang="en-US" dirty="0">
               <a:solidFill>
@@ -20599,7 +20633,7 @@
                     <a:schemeClr val="tx1"/>
                   </a:solidFill>
                 </a:rPr>
-                <a:t>CD: </a:t>
+                <a:t>C: </a:t>
               </a:r>
               <a:r>
                 <a:rPr lang="en-US" dirty="0">
@@ -20920,7 +20954,7 @@
                   <a:schemeClr val="tx1"/>
                 </a:solidFill>
               </a:rPr>
-              <a:t>Component</a:t>
+              <a:t>Comp. Inst.</a:t>
             </a:r>
             <a:endParaRPr lang="en-US" dirty="0">
               <a:solidFill>
@@ -20978,7 +21012,7 @@
                   <a:schemeClr val="tx1"/>
                 </a:solidFill>
               </a:rPr>
-              <a:t>Component</a:t>
+              <a:t>Comp. Inst.</a:t>
             </a:r>
             <a:endParaRPr lang="en-US" dirty="0">
               <a:solidFill>
@@ -21228,7 +21262,7 @@
                     <a:schemeClr val="tx1"/>
                   </a:solidFill>
                 </a:rPr>
-                <a:t>CD:</a:t>
+                <a:t>C:</a:t>
               </a:r>
               <a:endParaRPr lang="en-US" dirty="0">
                 <a:solidFill>
@@ -21558,7 +21592,7 @@
                   <a:schemeClr val="tx1"/>
                 </a:solidFill>
               </a:rPr>
-              <a:t>Component</a:t>
+              <a:t>Comp. Inst.</a:t>
             </a:r>
             <a:endParaRPr lang="en-US" dirty="0">
               <a:solidFill>
@@ -21641,7 +21675,7 @@
                     <a:schemeClr val="tx1"/>
                   </a:solidFill>
                 </a:rPr>
-                <a:t>CD:</a:t>
+                <a:t>C:</a:t>
               </a:r>
               <a:endParaRPr lang="en-US" dirty="0">
                 <a:solidFill>
@@ -22130,7 +22164,7 @@
                   <a:schemeClr val="tx1"/>
                 </a:solidFill>
               </a:rPr>
-              <a:t>Component</a:t>
+              <a:t>Comp. Inst.</a:t>
             </a:r>
             <a:endParaRPr lang="en-US" dirty="0">
               <a:solidFill>
@@ -22313,7 +22347,7 @@
                     <a:schemeClr val="tx1"/>
                   </a:solidFill>
                 </a:rPr>
-                <a:t>CD: </a:t>
+                <a:t>C: </a:t>
               </a:r>
               <a:endParaRPr lang="en-US" dirty="0">
                 <a:solidFill>

</xml_diff>

<commit_message>
swap ComponentInstance and SubComponent in SEP 036, 037, 043
</commit_message>
<xml_diff>
--- a/images/SEP037.pptx
+++ b/images/SEP037.pptx
@@ -216,7 +216,7 @@
           <a:p>
             <a:fld id="{AC861A86-5494-5244-8FB4-8B9B0FE298A2}" type="datetimeFigureOut">
               <a:rPr lang="en-US" smtClean="0"/>
-              <a:t>1/26/20</a:t>
+              <a:t>1/27/20</a:t>
             </a:fld>
             <a:endParaRPr lang="en-US"/>
           </a:p>
@@ -382,7 +382,7 @@
           <a:p>
             <a:fld id="{CF8A4C15-9D08-44BE-9908-991722DC07A4}" type="datetimeFigureOut">
               <a:rPr lang="en-US" smtClean="0"/>
-              <a:t>1/26/20</a:t>
+              <a:t>1/27/20</a:t>
             </a:fld>
             <a:endParaRPr lang="en-US"/>
           </a:p>
@@ -1166,7 +1166,7 @@
           <a:p>
             <a:fld id="{55158164-104B-EE4F-A1E4-DFD76C5D5D53}" type="datetime1">
               <a:rPr lang="en-US" smtClean="0"/>
-              <a:t>1/26/20</a:t>
+              <a:t>1/27/20</a:t>
             </a:fld>
             <a:endParaRPr lang="en-US"/>
           </a:p>
@@ -1267,7 +1267,7 @@
           </a:ln>
           <a:extLst>
             <a:ext uri="{91240B29-F687-4f45-9708-019B960494DF}">
-              <a14:hiddenLine xmlns="" xmlns:a14="http://schemas.microsoft.com/office/drawing/2010/main" w="9525">
+              <a14:hiddenLine xmlns:a14="http://schemas.microsoft.com/office/drawing/2010/main" xmlns="" w="9525">
                 <a:solidFill>
                   <a:srgbClr val="000000"/>
                 </a:solidFill>
@@ -1322,7 +1322,7 @@
           </a:ln>
           <a:extLst>
             <a:ext uri="{91240B29-F687-4f45-9708-019B960494DF}">
-              <a14:hiddenLine xmlns="" xmlns:a14="http://schemas.microsoft.com/office/drawing/2010/main" w="9525">
+              <a14:hiddenLine xmlns:a14="http://schemas.microsoft.com/office/drawing/2010/main" xmlns="" w="9525">
                 <a:solidFill>
                   <a:srgbClr val="000000"/>
                 </a:solidFill>
@@ -1577,7 +1577,7 @@
           <a:p>
             <a:fld id="{D3C8E1F3-BE47-4044-A97F-EFC75FD29BC1}" type="datetime1">
               <a:rPr lang="en-US" smtClean="0"/>
-              <a:t>1/26/20</a:t>
+              <a:t>1/27/20</a:t>
             </a:fld>
             <a:endParaRPr lang="en-US"/>
           </a:p>
@@ -1825,7 +1825,7 @@
           <a:p>
             <a:fld id="{3F5031B9-01B9-7047-B552-C013DA4C2A39}" type="datetime1">
               <a:rPr lang="en-US" smtClean="0"/>
-              <a:t>1/26/20</a:t>
+              <a:t>1/27/20</a:t>
             </a:fld>
             <a:endParaRPr lang="en-US"/>
           </a:p>
@@ -2365,7 +2365,7 @@
           <a:p>
             <a:fld id="{2AB77CA6-198C-0F4D-AECB-07C218E4D55F}" type="datetime1">
               <a:rPr lang="en-US" smtClean="0"/>
-              <a:t>1/26/20</a:t>
+              <a:t>1/27/20</a:t>
             </a:fld>
             <a:endParaRPr lang="en-US"/>
           </a:p>
@@ -2613,7 +2613,7 @@
           <a:p>
             <a:fld id="{BA2BE7C8-AC47-9642-9C4B-4A8081FE5F08}" type="datetime1">
               <a:rPr lang="en-US" smtClean="0"/>
-              <a:t>1/26/20</a:t>
+              <a:t>1/27/20</a:t>
             </a:fld>
             <a:endParaRPr lang="en-US"/>
           </a:p>
@@ -3145,7 +3145,7 @@
           <a:p>
             <a:fld id="{8AC07479-49B2-D64D-B87A-1D036117BD32}" type="datetime1">
               <a:rPr lang="en-US" smtClean="0"/>
-              <a:t>1/26/20</a:t>
+              <a:t>1/27/20</a:t>
             </a:fld>
             <a:endParaRPr lang="en-US"/>
           </a:p>
@@ -3442,7 +3442,7 @@
           <a:p>
             <a:fld id="{47BE2083-98A0-494E-96E5-57A024809BBB}" type="datetime1">
               <a:rPr lang="en-US" smtClean="0"/>
-              <a:t>1/26/20</a:t>
+              <a:t>1/27/20</a:t>
             </a:fld>
             <a:endParaRPr lang="en-US"/>
           </a:p>
@@ -3616,7 +3616,7 @@
           <a:p>
             <a:fld id="{BAE362AC-1F4C-A142-BBAB-35DEE19E089C}" type="datetime1">
               <a:rPr lang="en-US" smtClean="0"/>
-              <a:t>1/26/20</a:t>
+              <a:t>1/27/20</a:t>
             </a:fld>
             <a:endParaRPr lang="en-US"/>
           </a:p>
@@ -3796,7 +3796,7 @@
           <a:p>
             <a:fld id="{E3203DEE-4F0C-BD4D-94D3-7B4048608461}" type="datetime1">
               <a:rPr lang="en-US" smtClean="0"/>
-              <a:t>1/26/20</a:t>
+              <a:t>1/27/20</a:t>
             </a:fld>
             <a:endParaRPr lang="en-US"/>
           </a:p>
@@ -3981,7 +3981,7 @@
           <a:p>
             <a:fld id="{7034CD2D-1430-3C44-BF7A-01544DD8062E}" type="datetime1">
               <a:rPr lang="en-US" smtClean="0"/>
-              <a:t>1/26/20</a:t>
+              <a:t>1/27/20</a:t>
             </a:fld>
             <a:endParaRPr lang="en-US"/>
           </a:p>
@@ -4237,7 +4237,7 @@
           <a:p>
             <a:fld id="{8A05D642-7D5B-2D46-9E92-88D3869CC61C}" type="datetime1">
               <a:rPr lang="en-US" smtClean="0"/>
-              <a:t>1/26/20</a:t>
+              <a:t>1/27/20</a:t>
             </a:fld>
             <a:endParaRPr lang="en-US"/>
           </a:p>
@@ -4539,7 +4539,7 @@
           <a:p>
             <a:fld id="{F39C7A97-83DE-D242-8942-BEEC49C430EC}" type="datetime1">
               <a:rPr lang="en-US" smtClean="0"/>
-              <a:t>1/26/20</a:t>
+              <a:t>1/27/20</a:t>
             </a:fld>
             <a:endParaRPr lang="en-US"/>
           </a:p>
@@ -4981,7 +4981,7 @@
           <a:p>
             <a:fld id="{68B8F0D7-076E-8744-BF87-211ABDF40EEE}" type="datetime1">
               <a:rPr lang="en-US" smtClean="0"/>
-              <a:t>1/26/20</a:t>
+              <a:t>1/27/20</a:t>
             </a:fld>
             <a:endParaRPr lang="en-US"/>
           </a:p>
@@ -5099,7 +5099,7 @@
           <a:p>
             <a:fld id="{C1443501-53DF-9A44-B5A1-F4B6F4F70E65}" type="datetime1">
               <a:rPr lang="en-US" smtClean="0"/>
-              <a:t>1/26/20</a:t>
+              <a:t>1/27/20</a:t>
             </a:fld>
             <a:endParaRPr lang="en-US"/>
           </a:p>
@@ -5194,7 +5194,7 @@
           <a:p>
             <a:fld id="{99211CF8-3C51-4448-A604-0A860CF05CF6}" type="datetime1">
               <a:rPr lang="en-US" smtClean="0"/>
-              <a:t>1/26/20</a:t>
+              <a:t>1/27/20</a:t>
             </a:fld>
             <a:endParaRPr lang="en-US"/>
           </a:p>
@@ -5477,7 +5477,7 @@
           <a:p>
             <a:fld id="{E79CC5FC-1A63-8441-9C17-2DFBAF0F3052}" type="datetime1">
               <a:rPr lang="en-US" smtClean="0"/>
-              <a:t>1/26/20</a:t>
+              <a:t>1/27/20</a:t>
             </a:fld>
             <a:endParaRPr lang="en-US"/>
           </a:p>
@@ -5768,7 +5768,7 @@
           <a:p>
             <a:fld id="{A48C2071-2111-F84C-A005-37A8A4EBBECE}" type="datetime1">
               <a:rPr lang="en-US" smtClean="0"/>
-              <a:t>1/26/20</a:t>
+              <a:t>1/27/20</a:t>
             </a:fld>
             <a:endParaRPr lang="en-US"/>
           </a:p>
@@ -6295,7 +6295,7 @@
           <a:p>
             <a:fld id="{41892FCB-93AF-574B-B021-5BAFA3955FB7}" type="datetime1">
               <a:rPr lang="en-US" smtClean="0"/>
-              <a:t>1/26/20</a:t>
+              <a:t>1/27/20</a:t>
             </a:fld>
             <a:endParaRPr lang="en-US"/>
           </a:p>
@@ -10083,25 +10083,14 @@
           <a:p>
             <a:pPr algn="ctr"/>
             <a:r>
-              <a:rPr lang="en-US" b="1" dirty="0">
+              <a:rPr lang="en-US" b="1" dirty="0" err="1">
                 <a:solidFill>
                   <a:schemeClr val="tx1"/>
                 </a:solidFill>
               </a:rPr>
-              <a:t>Component</a:t>
+              <a:t>SubC</a:t>
             </a:r>
-          </a:p>
-          <a:p>
-            <a:pPr algn="ctr"/>
-            <a:r>
-              <a:rPr lang="en-US" b="1" dirty="0">
-                <a:solidFill>
-                  <a:schemeClr val="tx1"/>
-                </a:solidFill>
-              </a:rPr>
-              <a:t>Instance</a:t>
-            </a:r>
-            <a:endParaRPr lang="en-US" dirty="0">
+            <a:endParaRPr lang="en-US" b="1" dirty="0">
               <a:solidFill>
                 <a:schemeClr val="tx1"/>
               </a:solidFill>
@@ -10331,25 +10320,14 @@
           <a:p>
             <a:pPr algn="ctr"/>
             <a:r>
-              <a:rPr lang="en-US" b="1" dirty="0">
+              <a:rPr lang="en-US" b="1" dirty="0" err="1">
                 <a:solidFill>
                   <a:schemeClr val="tx1"/>
                 </a:solidFill>
               </a:rPr>
-              <a:t>Component</a:t>
+              <a:t>SubC</a:t>
             </a:r>
-          </a:p>
-          <a:p>
-            <a:pPr algn="ctr"/>
-            <a:r>
-              <a:rPr lang="en-US" b="1" dirty="0">
-                <a:solidFill>
-                  <a:schemeClr val="tx1"/>
-                </a:solidFill>
-              </a:rPr>
-              <a:t>Instance</a:t>
-            </a:r>
-            <a:endParaRPr lang="en-US" dirty="0">
+            <a:endParaRPr lang="en-US" b="1" dirty="0">
               <a:solidFill>
                 <a:schemeClr val="tx1"/>
               </a:solidFill>
@@ -11031,23 +11009,12 @@
           <a:p>
             <a:pPr algn="ctr"/>
             <a:r>
-              <a:rPr lang="en-US" b="1" dirty="0">
+              <a:rPr lang="en-US" b="1" dirty="0" err="1">
                 <a:solidFill>
                   <a:schemeClr val="tx1"/>
                 </a:solidFill>
               </a:rPr>
-              <a:t>Component</a:t>
-            </a:r>
-          </a:p>
-          <a:p>
-            <a:pPr algn="ctr"/>
-            <a:r>
-              <a:rPr lang="en-US" b="1" dirty="0">
-                <a:solidFill>
-                  <a:schemeClr val="tx1"/>
-                </a:solidFill>
-              </a:rPr>
-              <a:t>Instance</a:t>
+              <a:t>SubC</a:t>
             </a:r>
             <a:endParaRPr lang="en-US" dirty="0">
               <a:solidFill>
@@ -11447,7 +11414,7 @@
         <p:spPr>
           <a:xfrm>
             <a:off x="3787313" y="4198339"/>
-            <a:ext cx="1369286" cy="307777"/>
+            <a:ext cx="1725152" cy="307777"/>
           </a:xfrm>
           <a:prstGeom prst="rect">
             <a:avLst/>
@@ -11468,7 +11435,7 @@
                   </a:schemeClr>
                 </a:solidFill>
               </a:rPr>
-              <a:t>subComponent</a:t>
+              <a:t>componentInstance</a:t>
             </a:r>
             <a:endParaRPr lang="en-US" sz="1400" b="1" dirty="0">
               <a:solidFill>
@@ -15671,7 +15638,7 @@
                   <a:schemeClr val="tx1"/>
                 </a:solidFill>
               </a:rPr>
-              <a:t>ComponentInstance</a:t>
+              <a:t>SubC</a:t>
             </a:r>
             <a:endParaRPr lang="en-US" dirty="0">
               <a:solidFill>
@@ -15903,23 +15870,12 @@
           <a:p>
             <a:pPr algn="ctr"/>
             <a:r>
-              <a:rPr lang="en-US" b="1" dirty="0">
+              <a:rPr lang="en-US" b="1" dirty="0" err="1">
                 <a:solidFill>
                   <a:schemeClr val="tx1"/>
                 </a:solidFill>
               </a:rPr>
-              <a:t>Component</a:t>
-            </a:r>
-          </a:p>
-          <a:p>
-            <a:pPr algn="ctr"/>
-            <a:r>
-              <a:rPr lang="en-US" b="1" dirty="0">
-                <a:solidFill>
-                  <a:schemeClr val="tx1"/>
-                </a:solidFill>
-              </a:rPr>
-              <a:t>Instance</a:t>
+              <a:t>SubC</a:t>
             </a:r>
             <a:endParaRPr lang="en-US" dirty="0">
               <a:solidFill>
@@ -16603,23 +16559,12 @@
           <a:p>
             <a:pPr algn="ctr"/>
             <a:r>
-              <a:rPr lang="en-US" b="1" dirty="0">
+              <a:rPr lang="en-US" b="1" dirty="0" err="1">
                 <a:solidFill>
                   <a:schemeClr val="tx1"/>
                 </a:solidFill>
               </a:rPr>
-              <a:t>Component</a:t>
-            </a:r>
-          </a:p>
-          <a:p>
-            <a:pPr algn="ctr"/>
-            <a:r>
-              <a:rPr lang="en-US" b="1" dirty="0">
-                <a:solidFill>
-                  <a:schemeClr val="tx1"/>
-                </a:solidFill>
-              </a:rPr>
-              <a:t>Instance</a:t>
+              <a:t>SubC</a:t>
             </a:r>
             <a:endParaRPr lang="en-US" dirty="0">
               <a:solidFill>
@@ -17050,23 +16995,12 @@
           <a:p>
             <a:pPr algn="ctr"/>
             <a:r>
-              <a:rPr lang="en-US" b="1" dirty="0">
+              <a:rPr lang="en-US" b="1" dirty="0" err="1">
                 <a:solidFill>
                   <a:schemeClr val="tx1"/>
                 </a:solidFill>
               </a:rPr>
-              <a:t>Component</a:t>
-            </a:r>
-          </a:p>
-          <a:p>
-            <a:pPr algn="ctr"/>
-            <a:r>
-              <a:rPr lang="en-US" b="1" dirty="0">
-                <a:solidFill>
-                  <a:schemeClr val="tx1"/>
-                </a:solidFill>
-              </a:rPr>
-              <a:t>Instance</a:t>
+              <a:t>SubC</a:t>
             </a:r>
             <a:endParaRPr lang="en-US" dirty="0">
               <a:solidFill>
@@ -17467,8 +17401,8 @@
         </p:nvSpPr>
         <p:spPr>
           <a:xfrm>
-            <a:off x="3564168" y="5302777"/>
-            <a:ext cx="1369286" cy="307777"/>
+            <a:off x="3564168" y="5430102"/>
+            <a:ext cx="1725152" cy="307777"/>
           </a:xfrm>
           <a:prstGeom prst="rect">
             <a:avLst/>
@@ -17489,7 +17423,7 @@
                   </a:schemeClr>
                 </a:solidFill>
               </a:rPr>
-              <a:t>subComponent</a:t>
+              <a:t>componentInstance</a:t>
             </a:r>
             <a:endParaRPr lang="en-US" sz="1400" b="1" dirty="0">
               <a:solidFill>
@@ -17746,7 +17680,7 @@
         <p:spPr>
           <a:xfrm>
             <a:off x="4176604" y="2880640"/>
-            <a:ext cx="1369286" cy="307777"/>
+            <a:ext cx="1725152" cy="307777"/>
           </a:xfrm>
           <a:prstGeom prst="rect">
             <a:avLst/>
@@ -17767,7 +17701,7 @@
                   </a:schemeClr>
                 </a:solidFill>
               </a:rPr>
-              <a:t>subComponent</a:t>
+              <a:t>componentInstance</a:t>
             </a:r>
             <a:endParaRPr lang="en-US" sz="1400" b="1" dirty="0">
               <a:solidFill>
@@ -20949,12 +20883,12 @@
           <a:p>
             <a:pPr algn="ctr"/>
             <a:r>
-              <a:rPr lang="en-US" b="1" dirty="0">
+              <a:rPr lang="en-US" b="1" dirty="0" err="1">
                 <a:solidFill>
                   <a:schemeClr val="tx1"/>
                 </a:solidFill>
               </a:rPr>
-              <a:t>Comp. Inst.</a:t>
+              <a:t>SubC</a:t>
             </a:r>
             <a:endParaRPr lang="en-US" dirty="0">
               <a:solidFill>
@@ -21007,12 +20941,12 @@
           <a:p>
             <a:pPr algn="ctr"/>
             <a:r>
-              <a:rPr lang="en-US" b="1" dirty="0">
+              <a:rPr lang="en-US" b="1" dirty="0" err="1">
                 <a:solidFill>
                   <a:schemeClr val="tx1"/>
                 </a:solidFill>
               </a:rPr>
-              <a:t>Comp. Inst.</a:t>
+              <a:t>SubC</a:t>
             </a:r>
             <a:endParaRPr lang="en-US" dirty="0">
               <a:solidFill>
@@ -21587,12 +21521,12 @@
           <a:p>
             <a:pPr algn="ctr"/>
             <a:r>
-              <a:rPr lang="en-US" b="1" dirty="0">
+              <a:rPr lang="en-US" b="1" dirty="0" err="1">
                 <a:solidFill>
                   <a:schemeClr val="tx1"/>
                 </a:solidFill>
               </a:rPr>
-              <a:t>Comp. Inst.</a:t>
+              <a:t>SubC</a:t>
             </a:r>
             <a:endParaRPr lang="en-US" dirty="0">
               <a:solidFill>
@@ -22159,12 +22093,12 @@
           <a:p>
             <a:pPr algn="ctr"/>
             <a:r>
-              <a:rPr lang="en-US" b="1" dirty="0">
+              <a:rPr lang="en-US" b="1" dirty="0" err="1">
                 <a:solidFill>
                   <a:schemeClr val="tx1"/>
                 </a:solidFill>
               </a:rPr>
-              <a:t>Comp. Inst.</a:t>
+              <a:t>SubC</a:t>
             </a:r>
             <a:endParaRPr lang="en-US" dirty="0">
               <a:solidFill>
@@ -23130,8 +23064,8 @@
         </p:nvSpPr>
         <p:spPr>
           <a:xfrm>
-            <a:off x="3730138" y="4760186"/>
-            <a:ext cx="1369286" cy="307777"/>
+            <a:off x="3533367" y="4760186"/>
+            <a:ext cx="1725152" cy="307777"/>
           </a:xfrm>
           <a:prstGeom prst="rect">
             <a:avLst/>
@@ -23152,7 +23086,7 @@
                   </a:schemeClr>
                 </a:solidFill>
               </a:rPr>
-              <a:t>subComponent</a:t>
+              <a:t>componentInstance</a:t>
             </a:r>
             <a:endParaRPr lang="en-US" sz="1400" b="1" dirty="0">
               <a:solidFill>
@@ -23179,7 +23113,7 @@
         <p:spPr>
           <a:xfrm>
             <a:off x="1816787" y="4646392"/>
-            <a:ext cx="1369286" cy="307777"/>
+            <a:ext cx="1725152" cy="307777"/>
           </a:xfrm>
           <a:prstGeom prst="rect">
             <a:avLst/>
@@ -23200,7 +23134,7 @@
                   </a:schemeClr>
                 </a:solidFill>
               </a:rPr>
-              <a:t>subComponent</a:t>
+              <a:t>componentInstance</a:t>
             </a:r>
             <a:endParaRPr lang="en-US" sz="1400" b="1" dirty="0">
               <a:solidFill>

</xml_diff>